<commit_message>
leggere modifiche alla presentazione
</commit_message>
<xml_diff>
--- a/TemplatePresentazioneLaurea.pptx
+++ b/TemplatePresentazioneLaurea.pptx
@@ -11,14 +11,12 @@
     <p:sldId id="260" r:id="rId5"/>
     <p:sldId id="261" r:id="rId6"/>
     <p:sldId id="263" r:id="rId7"/>
-    <p:sldId id="270" r:id="rId8"/>
+    <p:sldId id="266" r:id="rId8"/>
     <p:sldId id="262" r:id="rId9"/>
     <p:sldId id="265" r:id="rId10"/>
-    <p:sldId id="266" r:id="rId11"/>
-    <p:sldId id="267" r:id="rId12"/>
-    <p:sldId id="264" r:id="rId13"/>
-    <p:sldId id="268" r:id="rId14"/>
-    <p:sldId id="269" r:id="rId15"/>
+    <p:sldId id="264" r:id="rId11"/>
+    <p:sldId id="268" r:id="rId12"/>
+    <p:sldId id="269" r:id="rId13"/>
   </p:sldIdLst>
   <p:sldSz cx="12192000" cy="6858000"/>
   <p:notesSz cx="6858000" cy="9144000"/>
@@ -254,7 +252,7 @@
           <a:p>
             <a:fld id="{EF808957-8B83-4642-92C5-B1B3B46DCEA7}" type="datetimeFigureOut">
               <a:rPr lang="it-IT" smtClean="0"/>
-              <a:t>05/12/2016</a:t>
+              <a:t>10/12/2016</a:t>
             </a:fld>
             <a:endParaRPr lang="it-IT"/>
           </a:p>
@@ -422,7 +420,7 @@
           <a:p>
             <a:fld id="{EF808957-8B83-4642-92C5-B1B3B46DCEA7}" type="datetimeFigureOut">
               <a:rPr lang="it-IT" smtClean="0"/>
-              <a:t>05/12/2016</a:t>
+              <a:t>10/12/2016</a:t>
             </a:fld>
             <a:endParaRPr lang="it-IT"/>
           </a:p>
@@ -600,7 +598,7 @@
           <a:p>
             <a:fld id="{EF808957-8B83-4642-92C5-B1B3B46DCEA7}" type="datetimeFigureOut">
               <a:rPr lang="it-IT" smtClean="0"/>
-              <a:t>05/12/2016</a:t>
+              <a:t>10/12/2016</a:t>
             </a:fld>
             <a:endParaRPr lang="it-IT"/>
           </a:p>
@@ -768,7 +766,7 @@
           <a:p>
             <a:fld id="{EF808957-8B83-4642-92C5-B1B3B46DCEA7}" type="datetimeFigureOut">
               <a:rPr lang="it-IT" smtClean="0"/>
-              <a:t>05/12/2016</a:t>
+              <a:t>10/12/2016</a:t>
             </a:fld>
             <a:endParaRPr lang="it-IT"/>
           </a:p>
@@ -1013,7 +1011,7 @@
           <a:p>
             <a:fld id="{EF808957-8B83-4642-92C5-B1B3B46DCEA7}" type="datetimeFigureOut">
               <a:rPr lang="it-IT" smtClean="0"/>
-              <a:t>05/12/2016</a:t>
+              <a:t>10/12/2016</a:t>
             </a:fld>
             <a:endParaRPr lang="it-IT"/>
           </a:p>
@@ -1242,7 +1240,7 @@
           <a:p>
             <a:fld id="{EF808957-8B83-4642-92C5-B1B3B46DCEA7}" type="datetimeFigureOut">
               <a:rPr lang="it-IT" smtClean="0"/>
-              <a:t>05/12/2016</a:t>
+              <a:t>10/12/2016</a:t>
             </a:fld>
             <a:endParaRPr lang="it-IT"/>
           </a:p>
@@ -1606,7 +1604,7 @@
           <a:p>
             <a:fld id="{EF808957-8B83-4642-92C5-B1B3B46DCEA7}" type="datetimeFigureOut">
               <a:rPr lang="it-IT" smtClean="0"/>
-              <a:t>05/12/2016</a:t>
+              <a:t>10/12/2016</a:t>
             </a:fld>
             <a:endParaRPr lang="it-IT"/>
           </a:p>
@@ -1723,7 +1721,7 @@
           <a:p>
             <a:fld id="{EF808957-8B83-4642-92C5-B1B3B46DCEA7}" type="datetimeFigureOut">
               <a:rPr lang="it-IT" smtClean="0"/>
-              <a:t>05/12/2016</a:t>
+              <a:t>10/12/2016</a:t>
             </a:fld>
             <a:endParaRPr lang="it-IT"/>
           </a:p>
@@ -1818,7 +1816,7 @@
           <a:p>
             <a:fld id="{EF808957-8B83-4642-92C5-B1B3B46DCEA7}" type="datetimeFigureOut">
               <a:rPr lang="it-IT" smtClean="0"/>
-              <a:t>05/12/2016</a:t>
+              <a:t>10/12/2016</a:t>
             </a:fld>
             <a:endParaRPr lang="it-IT"/>
           </a:p>
@@ -2093,7 +2091,7 @@
           <a:p>
             <a:fld id="{EF808957-8B83-4642-92C5-B1B3B46DCEA7}" type="datetimeFigureOut">
               <a:rPr lang="it-IT" smtClean="0"/>
-              <a:t>05/12/2016</a:t>
+              <a:t>10/12/2016</a:t>
             </a:fld>
             <a:endParaRPr lang="it-IT"/>
           </a:p>
@@ -2345,7 +2343,7 @@
           <a:p>
             <a:fld id="{EF808957-8B83-4642-92C5-B1B3B46DCEA7}" type="datetimeFigureOut">
               <a:rPr lang="it-IT" smtClean="0"/>
-              <a:t>05/12/2016</a:t>
+              <a:t>10/12/2016</a:t>
             </a:fld>
             <a:endParaRPr lang="it-IT"/>
           </a:p>
@@ -2556,7 +2554,7 @@
           <a:p>
             <a:fld id="{EF808957-8B83-4642-92C5-B1B3B46DCEA7}" type="datetimeFigureOut">
               <a:rPr lang="it-IT" smtClean="0"/>
-              <a:t>05/12/2016</a:t>
+              <a:t>10/12/2016</a:t>
             </a:fld>
             <a:endParaRPr lang="it-IT"/>
           </a:p>
@@ -3238,12 +3236,20 @@
           <a:lstStyle/>
           <a:p>
             <a:r>
+              <a:rPr lang="it-IT" dirty="0" err="1">
+                <a:solidFill>
+                  <a:schemeClr val="bg1"/>
+                </a:solidFill>
+              </a:rPr>
+              <a:t>Factory</a:t>
+            </a:r>
+            <a:r>
               <a:rPr lang="it-IT" dirty="0">
                 <a:solidFill>
                   <a:schemeClr val="bg1"/>
                 </a:solidFill>
               </a:rPr>
-              <a:t>Architettura Generale</a:t>
+              <a:t> Method</a:t>
             </a:r>
           </a:p>
         </p:txBody>
@@ -3285,8 +3291,8 @@
         </p:nvSpPr>
         <p:spPr>
           <a:xfrm>
-            <a:off x="11198087" y="6386732"/>
-            <a:ext cx="896612" cy="369332"/>
+            <a:off x="11078817" y="6386732"/>
+            <a:ext cx="1015881" cy="369332"/>
           </a:xfrm>
           <a:prstGeom prst="rect">
             <a:avLst/>
@@ -3305,14 +3311,14 @@
                   <a:schemeClr val="bg1"/>
                 </a:solidFill>
               </a:rPr>
-              <a:t>9 di 13</a:t>
+              <a:t>9 di 11</a:t>
             </a:r>
           </a:p>
         </p:txBody>
       </p:sp>
       <p:pic>
         <p:nvPicPr>
-          <p:cNvPr id="3" name="Immagine 2"/>
+          <p:cNvPr id="4" name="Immagine 3"/>
           <p:cNvPicPr>
             <a:picLocks noChangeAspect="1"/>
           </p:cNvPicPr>
@@ -3332,18 +3338,232 @@
         </p:blipFill>
         <p:spPr>
           <a:xfrm>
-            <a:off x="317735" y="1127484"/>
-            <a:ext cx="11556213" cy="4998734"/>
+            <a:off x="-1" y="787792"/>
+            <a:ext cx="4678017" cy="5774104"/>
           </a:xfrm>
           <a:prstGeom prst="rect">
             <a:avLst/>
           </a:prstGeom>
         </p:spPr>
       </p:pic>
+      <p:sp>
+        <p:nvSpPr>
+          <p:cNvPr id="3" name="CasellaDiTesto 2"/>
+          <p:cNvSpPr txBox="1"/>
+          <p:nvPr/>
+        </p:nvSpPr>
+        <p:spPr>
+          <a:xfrm>
+            <a:off x="5797442" y="4346127"/>
+            <a:ext cx="5789315" cy="1200329"/>
+          </a:xfrm>
+          <a:prstGeom prst="rect">
+            <a:avLst/>
+          </a:prstGeom>
+          <a:noFill/>
+        </p:spPr>
+        <p:txBody>
+          <a:bodyPr wrap="square" rtlCol="0">
+            <a:spAutoFit/>
+          </a:bodyPr>
+          <a:lstStyle/>
+          <a:p>
+            <a:pPr marL="342900" indent="-342900">
+              <a:buFont typeface="Arial" panose="020B0604020202020204" pitchFamily="34" charset="0"/>
+              <a:buChar char="•"/>
+            </a:pPr>
+            <a:r>
+              <a:rPr lang="it-IT" sz="2400" i="1" dirty="0"/>
+              <a:t>/api/</a:t>
+            </a:r>
+            <a:r>
+              <a:rPr lang="it-IT" sz="2400" i="1" dirty="0" err="1"/>
+              <a:t>organizations</a:t>
+            </a:r>
+            <a:r>
+              <a:rPr lang="it-IT" sz="2400" i="1" dirty="0"/>
+              <a:t>/</a:t>
+            </a:r>
+            <a:r>
+              <a:rPr lang="it-IT" sz="2400" b="1" i="1" dirty="0"/>
+              <a:t>ORGDYN</a:t>
+            </a:r>
+            <a:r>
+              <a:rPr lang="it-IT" sz="2400" i="1" dirty="0"/>
+              <a:t>/</a:t>
+            </a:r>
+            <a:r>
+              <a:rPr lang="it-IT" sz="2400" i="1" dirty="0" err="1"/>
+              <a:t>proposals</a:t>
+            </a:r>
+            <a:endParaRPr lang="it-IT" sz="2400" i="1" dirty="0"/>
+          </a:p>
+          <a:p>
+            <a:pPr marL="342900" indent="-342900">
+              <a:buFont typeface="Arial" panose="020B0604020202020204" pitchFamily="34" charset="0"/>
+              <a:buChar char="•"/>
+            </a:pPr>
+            <a:r>
+              <a:rPr lang="it-IT" sz="2400" i="1" dirty="0"/>
+              <a:t>/api/</a:t>
+            </a:r>
+            <a:r>
+              <a:rPr lang="it-IT" sz="2400" i="1" dirty="0" err="1"/>
+              <a:t>organizations</a:t>
+            </a:r>
+            <a:r>
+              <a:rPr lang="it-IT" sz="2400" i="1" dirty="0"/>
+              <a:t>/</a:t>
+            </a:r>
+            <a:r>
+              <a:rPr lang="it-IT" sz="2400" b="1" i="1" dirty="0"/>
+              <a:t>ORGSF</a:t>
+            </a:r>
+            <a:r>
+              <a:rPr lang="it-IT" sz="2400" i="1" dirty="0"/>
+              <a:t>/</a:t>
+            </a:r>
+            <a:r>
+              <a:rPr lang="it-IT" sz="2400" i="1" dirty="0" err="1"/>
+              <a:t>proposals</a:t>
+            </a:r>
+            <a:endParaRPr lang="it-IT" sz="2400" i="1" dirty="0"/>
+          </a:p>
+          <a:p>
+            <a:pPr marL="342900" indent="-342900">
+              <a:buFont typeface="Arial" panose="020B0604020202020204" pitchFamily="34" charset="0"/>
+              <a:buChar char="•"/>
+            </a:pPr>
+            <a:endParaRPr lang="it-IT" sz="2400" i="1" dirty="0"/>
+          </a:p>
+        </p:txBody>
+      </p:sp>
+      <p:sp>
+        <p:nvSpPr>
+          <p:cNvPr id="5" name="CasellaDiTesto 4"/>
+          <p:cNvSpPr txBox="1"/>
+          <p:nvPr/>
+        </p:nvSpPr>
+        <p:spPr>
+          <a:xfrm>
+            <a:off x="5919365" y="1759941"/>
+            <a:ext cx="6365400" cy="646331"/>
+          </a:xfrm>
+          <a:prstGeom prst="rect">
+            <a:avLst/>
+          </a:prstGeom>
+          <a:noFill/>
+        </p:spPr>
+        <p:txBody>
+          <a:bodyPr wrap="square" rtlCol="0">
+            <a:spAutoFit/>
+          </a:bodyPr>
+          <a:lstStyle/>
+          <a:p>
+            <a:r>
+              <a:rPr lang="it-IT" sz="3600" dirty="0"/>
+              <a:t>URL Richieste HTTP GET</a:t>
+            </a:r>
+          </a:p>
+        </p:txBody>
+      </p:sp>
+      <p:sp>
+        <p:nvSpPr>
+          <p:cNvPr id="8" name="CasellaDiTesto 7"/>
+          <p:cNvSpPr txBox="1"/>
+          <p:nvPr/>
+        </p:nvSpPr>
+        <p:spPr>
+          <a:xfrm>
+            <a:off x="5036229" y="2450550"/>
+            <a:ext cx="7058469" cy="830997"/>
+          </a:xfrm>
+          <a:prstGeom prst="rect">
+            <a:avLst/>
+          </a:prstGeom>
+          <a:noFill/>
+        </p:spPr>
+        <p:txBody>
+          <a:bodyPr wrap="square" rtlCol="0">
+            <a:spAutoFit/>
+          </a:bodyPr>
+          <a:lstStyle/>
+          <a:p>
+            <a:r>
+              <a:rPr lang="it-IT" sz="2400" i="1" dirty="0"/>
+              <a:t>/api/</a:t>
+            </a:r>
+            <a:r>
+              <a:rPr lang="it-IT" sz="2400" i="1" dirty="0" err="1"/>
+              <a:t>organizations</a:t>
+            </a:r>
+            <a:r>
+              <a:rPr lang="it-IT" sz="2400" i="1" dirty="0"/>
+              <a:t>/</a:t>
+            </a:r>
+            <a:r>
+              <a:rPr lang="it-IT" sz="2400" b="1" i="1" dirty="0"/>
+              <a:t>{</a:t>
+            </a:r>
+            <a:r>
+              <a:rPr lang="it-IT" sz="2400" b="1" i="1" dirty="0" err="1"/>
+              <a:t>orgaizationId</a:t>
+            </a:r>
+            <a:r>
+              <a:rPr lang="it-IT" sz="2400" b="1" i="1" dirty="0"/>
+              <a:t>}</a:t>
+            </a:r>
+            <a:r>
+              <a:rPr lang="it-IT" sz="2400" i="1" dirty="0"/>
+              <a:t>/{</a:t>
+            </a:r>
+            <a:r>
+              <a:rPr lang="it-IT" sz="2400" i="1" dirty="0" err="1"/>
+              <a:t>endpointRisorsa</a:t>
+            </a:r>
+            <a:r>
+              <a:rPr lang="it-IT" sz="2400" i="1" dirty="0"/>
+              <a:t>}</a:t>
+            </a:r>
+          </a:p>
+          <a:p>
+            <a:endParaRPr lang="it-IT" sz="2400" dirty="0"/>
+          </a:p>
+        </p:txBody>
+      </p:sp>
+      <p:sp>
+        <p:nvSpPr>
+          <p:cNvPr id="9" name="CasellaDiTesto 8"/>
+          <p:cNvSpPr txBox="1"/>
+          <p:nvPr/>
+        </p:nvSpPr>
+        <p:spPr>
+          <a:xfrm>
+            <a:off x="6169829" y="3611241"/>
+            <a:ext cx="5678941" cy="646331"/>
+          </a:xfrm>
+          <a:prstGeom prst="rect">
+            <a:avLst/>
+          </a:prstGeom>
+          <a:noFill/>
+        </p:spPr>
+        <p:txBody>
+          <a:bodyPr wrap="square" rtlCol="0">
+            <a:spAutoFit/>
+          </a:bodyPr>
+          <a:lstStyle/>
+          <a:p>
+            <a:r>
+              <a:rPr lang="it-IT" sz="3600" dirty="0"/>
+              <a:t>Esempio richieste HTTP</a:t>
+            </a:r>
+          </a:p>
+        </p:txBody>
+      </p:sp>
     </p:spTree>
     <p:extLst>
       <p:ext uri="{BB962C8B-B14F-4D97-AF65-F5344CB8AC3E}">
-        <p14:creationId xmlns:p14="http://schemas.microsoft.com/office/powerpoint/2010/main" val="2088623736"/>
+        <p14:creationId xmlns:p14="http://schemas.microsoft.com/office/powerpoint/2010/main" val="3968237310"/>
       </p:ext>
     </p:extLst>
   </p:cSld>
@@ -3412,7 +3632,7 @@
                   <a:schemeClr val="bg1"/>
                 </a:solidFill>
               </a:rPr>
-              <a:t>Database</a:t>
+              <a:t>Qualità e test</a:t>
             </a:r>
           </a:p>
         </p:txBody>
@@ -3454,8 +3674,8 @@
         </p:nvSpPr>
         <p:spPr>
           <a:xfrm>
-            <a:off x="11092070" y="6386732"/>
-            <a:ext cx="1002628" cy="369332"/>
+            <a:off x="11065565" y="6386732"/>
+            <a:ext cx="1029133" cy="369332"/>
           </a:xfrm>
           <a:prstGeom prst="rect">
             <a:avLst/>
@@ -3474,14 +3694,86 @@
                   <a:schemeClr val="bg1"/>
                 </a:solidFill>
               </a:rPr>
-              <a:t>10 di 13</a:t>
+              <a:t>10 di 11</a:t>
+            </a:r>
+          </a:p>
+        </p:txBody>
+      </p:sp>
+      <p:sp>
+        <p:nvSpPr>
+          <p:cNvPr id="3" name="CasellaDiTesto 2"/>
+          <p:cNvSpPr txBox="1"/>
+          <p:nvPr/>
+        </p:nvSpPr>
+        <p:spPr>
+          <a:xfrm>
+            <a:off x="177019" y="1033670"/>
+            <a:ext cx="11776442" cy="1323439"/>
+          </a:xfrm>
+          <a:prstGeom prst="rect">
+            <a:avLst/>
+          </a:prstGeom>
+          <a:noFill/>
+        </p:spPr>
+        <p:txBody>
+          <a:bodyPr wrap="square" rtlCol="0">
+            <a:spAutoFit/>
+          </a:bodyPr>
+          <a:lstStyle/>
+          <a:p>
+            <a:r>
+              <a:rPr lang="it-IT" sz="2400" dirty="0"/>
+              <a:t>Insieme delle caratteristiche di un'entità (prodotto, processo, servizio) che ne determinano la capacità di soddisfare esigenze espresse e implicite.</a:t>
+            </a:r>
+          </a:p>
+          <a:p>
+            <a:pPr algn="r"/>
+            <a:r>
+              <a:rPr lang="it-IT" sz="1400" i="1" dirty="0"/>
+              <a:t>(ISO 8402:1994, glossario dei termini, confluito in ISO 9000:2005)</a:t>
+            </a:r>
+          </a:p>
+          <a:p>
+            <a:endParaRPr lang="it-IT" dirty="0"/>
+          </a:p>
+        </p:txBody>
+      </p:sp>
+      <p:sp>
+        <p:nvSpPr>
+          <p:cNvPr id="5" name="CasellaDiTesto 4"/>
+          <p:cNvSpPr txBox="1"/>
+          <p:nvPr/>
+        </p:nvSpPr>
+        <p:spPr>
+          <a:xfrm>
+            <a:off x="4320209" y="2355331"/>
+            <a:ext cx="4174434" cy="646331"/>
+          </a:xfrm>
+          <a:prstGeom prst="rect">
+            <a:avLst/>
+          </a:prstGeom>
+          <a:noFill/>
+        </p:spPr>
+        <p:txBody>
+          <a:bodyPr wrap="square" rtlCol="0">
+            <a:spAutoFit/>
+          </a:bodyPr>
+          <a:lstStyle/>
+          <a:p>
+            <a:r>
+              <a:rPr lang="it-IT" sz="3600" dirty="0" err="1"/>
+              <a:t>Tests</a:t>
+            </a:r>
+            <a:r>
+              <a:rPr lang="it-IT" sz="3600" dirty="0"/>
+              <a:t> strutturali</a:t>
             </a:r>
           </a:p>
         </p:txBody>
       </p:sp>
       <p:pic>
         <p:nvPicPr>
-          <p:cNvPr id="3" name="Immagine 2"/>
+          <p:cNvPr id="8" name="Immagine 7"/>
           <p:cNvPicPr>
             <a:picLocks noChangeAspect="1"/>
           </p:cNvPicPr>
@@ -3501,100 +3793,18 @@
         </p:blipFill>
         <p:spPr>
           <a:xfrm>
-            <a:off x="177019" y="1607716"/>
-            <a:ext cx="6000454" cy="3592377"/>
+            <a:off x="2226665" y="3001662"/>
+            <a:ext cx="7438611" cy="3137277"/>
           </a:xfrm>
           <a:prstGeom prst="rect">
             <a:avLst/>
           </a:prstGeom>
         </p:spPr>
       </p:pic>
-      <p:sp>
-        <p:nvSpPr>
-          <p:cNvPr id="4" name="CasellaDiTesto 3"/>
-          <p:cNvSpPr txBox="1"/>
-          <p:nvPr/>
-        </p:nvSpPr>
-        <p:spPr>
-          <a:xfrm>
-            <a:off x="6612835" y="1865528"/>
-            <a:ext cx="5221356" cy="3359061"/>
-          </a:xfrm>
-          <a:prstGeom prst="rect">
-            <a:avLst/>
-          </a:prstGeom>
-          <a:noFill/>
-        </p:spPr>
-        <p:txBody>
-          <a:bodyPr wrap="square" rtlCol="0">
-            <a:spAutoFit/>
-          </a:bodyPr>
-          <a:lstStyle/>
-          <a:p>
-            <a:pPr marL="285750" indent="-285750">
-              <a:lnSpc>
-                <a:spcPct val="150000"/>
-              </a:lnSpc>
-              <a:buFont typeface="Arial" panose="020B0604020202020204" pitchFamily="34" charset="0"/>
-              <a:buChar char="•"/>
-            </a:pPr>
-            <a:r>
-              <a:rPr lang="it-IT" sz="2400" b="1" dirty="0"/>
-              <a:t>Id:</a:t>
-            </a:r>
-            <a:r>
-              <a:rPr lang="it-IT" sz="2400" dirty="0"/>
-              <a:t> Identificativo dell’organizzazione che utilizza ADCrm</a:t>
-            </a:r>
-          </a:p>
-          <a:p>
-            <a:pPr marL="285750" indent="-285750">
-              <a:lnSpc>
-                <a:spcPct val="150000"/>
-              </a:lnSpc>
-              <a:buFont typeface="Arial" panose="020B0604020202020204" pitchFamily="34" charset="0"/>
-              <a:buChar char="•"/>
-            </a:pPr>
-            <a:r>
-              <a:rPr lang="it-IT" sz="2400" b="1" dirty="0" err="1"/>
-              <a:t>Type</a:t>
-            </a:r>
-            <a:r>
-              <a:rPr lang="it-IT" sz="2400" b="1" dirty="0"/>
-              <a:t>: </a:t>
-            </a:r>
-            <a:r>
-              <a:rPr lang="it-IT" sz="2400" dirty="0"/>
-              <a:t>Tipologia di CRM (Salesforce o Dynamics)</a:t>
-            </a:r>
-          </a:p>
-          <a:p>
-            <a:pPr marL="285750" indent="-285750">
-              <a:lnSpc>
-                <a:spcPct val="150000"/>
-              </a:lnSpc>
-              <a:buFont typeface="Arial" panose="020B0604020202020204" pitchFamily="34" charset="0"/>
-              <a:buChar char="•"/>
-            </a:pPr>
-            <a:r>
-              <a:rPr lang="it-IT" sz="2400" b="1" dirty="0" err="1"/>
-              <a:t>AuthToken</a:t>
-            </a:r>
-            <a:r>
-              <a:rPr lang="it-IT" sz="2400" b="1" dirty="0"/>
-              <a:t>: </a:t>
-            </a:r>
-            <a:r>
-              <a:rPr lang="it-IT" sz="2400" dirty="0"/>
-              <a:t>Dati per poter interrogare i CRM</a:t>
-            </a:r>
-          </a:p>
-        </p:txBody>
-      </p:sp>
     </p:spTree>
     <p:extLst>
       <p:ext uri="{BB962C8B-B14F-4D97-AF65-F5344CB8AC3E}">
-        <p14:creationId xmlns:p14="http://schemas.microsoft.com/office/powerpoint/2010/main" val="1580919981"/>
+        <p14:creationId xmlns:p14="http://schemas.microsoft.com/office/powerpoint/2010/main" val="3414928305"/>
       </p:ext>
     </p:extLst>
   </p:cSld>
@@ -3658,20 +3868,12 @@
           <a:lstStyle/>
           <a:p>
             <a:r>
-              <a:rPr lang="it-IT" dirty="0" err="1">
-                <a:solidFill>
-                  <a:schemeClr val="bg1"/>
-                </a:solidFill>
-              </a:rPr>
-              <a:t>Factory</a:t>
-            </a:r>
-            <a:r>
               <a:rPr lang="it-IT" dirty="0">
                 <a:solidFill>
                   <a:schemeClr val="bg1"/>
                 </a:solidFill>
               </a:rPr>
-              <a:t> Method</a:t>
+              <a:t>Conclusioni</a:t>
             </a:r>
           </a:p>
         </p:txBody>
@@ -3713,8 +3915,8 @@
         </p:nvSpPr>
         <p:spPr>
           <a:xfrm>
-            <a:off x="11078817" y="6386732"/>
-            <a:ext cx="1015881" cy="369332"/>
+            <a:off x="11092070" y="6386732"/>
+            <a:ext cx="1002628" cy="369332"/>
           </a:xfrm>
           <a:prstGeom prst="rect">
             <a:avLst/>
@@ -3733,631 +3935,7 @@
                   <a:schemeClr val="bg1"/>
                 </a:solidFill>
               </a:rPr>
-              <a:t>11 di 13</a:t>
-            </a:r>
-          </a:p>
-        </p:txBody>
-      </p:sp>
-      <p:pic>
-        <p:nvPicPr>
-          <p:cNvPr id="4" name="Immagine 3"/>
-          <p:cNvPicPr>
-            <a:picLocks noChangeAspect="1"/>
-          </p:cNvPicPr>
-          <p:nvPr/>
-        </p:nvPicPr>
-        <p:blipFill>
-          <a:blip r:embed="rId4">
-            <a:extLst>
-              <a:ext uri="{28A0092B-C50C-407E-A947-70E740481C1C}">
-                <a14:useLocalDpi xmlns:a14="http://schemas.microsoft.com/office/drawing/2010/main" val="0"/>
-              </a:ext>
-            </a:extLst>
-          </a:blip>
-          <a:stretch>
-            <a:fillRect/>
-          </a:stretch>
-        </p:blipFill>
-        <p:spPr>
-          <a:xfrm>
-            <a:off x="-1" y="787792"/>
-            <a:ext cx="4678017" cy="5774104"/>
-          </a:xfrm>
-          <a:prstGeom prst="rect">
-            <a:avLst/>
-          </a:prstGeom>
-        </p:spPr>
-      </p:pic>
-      <p:sp>
-        <p:nvSpPr>
-          <p:cNvPr id="3" name="CasellaDiTesto 2"/>
-          <p:cNvSpPr txBox="1"/>
-          <p:nvPr/>
-        </p:nvSpPr>
-        <p:spPr>
-          <a:xfrm>
-            <a:off x="5797442" y="4346127"/>
-            <a:ext cx="5789315" cy="1200329"/>
-          </a:xfrm>
-          <a:prstGeom prst="rect">
-            <a:avLst/>
-          </a:prstGeom>
-          <a:noFill/>
-        </p:spPr>
-        <p:txBody>
-          <a:bodyPr wrap="square" rtlCol="0">
-            <a:spAutoFit/>
-          </a:bodyPr>
-          <a:lstStyle/>
-          <a:p>
-            <a:pPr marL="342900" indent="-342900">
-              <a:buFont typeface="Arial" panose="020B0604020202020204" pitchFamily="34" charset="0"/>
-              <a:buChar char="•"/>
-            </a:pPr>
-            <a:r>
-              <a:rPr lang="it-IT" sz="2400" i="1" dirty="0"/>
-              <a:t>/api/</a:t>
-            </a:r>
-            <a:r>
-              <a:rPr lang="it-IT" sz="2400" i="1" dirty="0" err="1"/>
-              <a:t>organizations</a:t>
-            </a:r>
-            <a:r>
-              <a:rPr lang="it-IT" sz="2400" i="1" dirty="0"/>
-              <a:t>/</a:t>
-            </a:r>
-            <a:r>
-              <a:rPr lang="it-IT" sz="2400" b="1" i="1" dirty="0"/>
-              <a:t>ORGDYN</a:t>
-            </a:r>
-            <a:r>
-              <a:rPr lang="it-IT" sz="2400" i="1" dirty="0"/>
-              <a:t>/</a:t>
-            </a:r>
-            <a:r>
-              <a:rPr lang="it-IT" sz="2400" i="1" dirty="0" err="1"/>
-              <a:t>proposals</a:t>
-            </a:r>
-            <a:endParaRPr lang="it-IT" sz="2400" i="1" dirty="0"/>
-          </a:p>
-          <a:p>
-            <a:pPr marL="342900" indent="-342900">
-              <a:buFont typeface="Arial" panose="020B0604020202020204" pitchFamily="34" charset="0"/>
-              <a:buChar char="•"/>
-            </a:pPr>
-            <a:r>
-              <a:rPr lang="it-IT" sz="2400" i="1" dirty="0"/>
-              <a:t>/api/</a:t>
-            </a:r>
-            <a:r>
-              <a:rPr lang="it-IT" sz="2400" i="1" dirty="0" err="1"/>
-              <a:t>organizations</a:t>
-            </a:r>
-            <a:r>
-              <a:rPr lang="it-IT" sz="2400" i="1" dirty="0"/>
-              <a:t>/</a:t>
-            </a:r>
-            <a:r>
-              <a:rPr lang="it-IT" sz="2400" b="1" i="1" dirty="0"/>
-              <a:t>ORGSF</a:t>
-            </a:r>
-            <a:r>
-              <a:rPr lang="it-IT" sz="2400" i="1" dirty="0"/>
-              <a:t>/</a:t>
-            </a:r>
-            <a:r>
-              <a:rPr lang="it-IT" sz="2400" i="1" dirty="0" err="1"/>
-              <a:t>proposals</a:t>
-            </a:r>
-            <a:endParaRPr lang="it-IT" sz="2400" i="1" dirty="0"/>
-          </a:p>
-          <a:p>
-            <a:pPr marL="342900" indent="-342900">
-              <a:buFont typeface="Arial" panose="020B0604020202020204" pitchFamily="34" charset="0"/>
-              <a:buChar char="•"/>
-            </a:pPr>
-            <a:endParaRPr lang="it-IT" sz="2400" i="1" dirty="0"/>
-          </a:p>
-        </p:txBody>
-      </p:sp>
-      <p:sp>
-        <p:nvSpPr>
-          <p:cNvPr id="5" name="CasellaDiTesto 4"/>
-          <p:cNvSpPr txBox="1"/>
-          <p:nvPr/>
-        </p:nvSpPr>
-        <p:spPr>
-          <a:xfrm>
-            <a:off x="5919365" y="1759941"/>
-            <a:ext cx="6365400" cy="646331"/>
-          </a:xfrm>
-          <a:prstGeom prst="rect">
-            <a:avLst/>
-          </a:prstGeom>
-          <a:noFill/>
-        </p:spPr>
-        <p:txBody>
-          <a:bodyPr wrap="square" rtlCol="0">
-            <a:spAutoFit/>
-          </a:bodyPr>
-          <a:lstStyle/>
-          <a:p>
-            <a:r>
-              <a:rPr lang="it-IT" sz="3600" dirty="0"/>
-              <a:t>URL Richieste HTTP GET</a:t>
-            </a:r>
-          </a:p>
-        </p:txBody>
-      </p:sp>
-      <p:sp>
-        <p:nvSpPr>
-          <p:cNvPr id="8" name="CasellaDiTesto 7"/>
-          <p:cNvSpPr txBox="1"/>
-          <p:nvPr/>
-        </p:nvSpPr>
-        <p:spPr>
-          <a:xfrm>
-            <a:off x="5036229" y="2450550"/>
-            <a:ext cx="7058469" cy="830997"/>
-          </a:xfrm>
-          <a:prstGeom prst="rect">
-            <a:avLst/>
-          </a:prstGeom>
-          <a:noFill/>
-        </p:spPr>
-        <p:txBody>
-          <a:bodyPr wrap="square" rtlCol="0">
-            <a:spAutoFit/>
-          </a:bodyPr>
-          <a:lstStyle/>
-          <a:p>
-            <a:r>
-              <a:rPr lang="it-IT" sz="2400" i="1" dirty="0"/>
-              <a:t>/api/</a:t>
-            </a:r>
-            <a:r>
-              <a:rPr lang="it-IT" sz="2400" i="1" dirty="0" err="1"/>
-              <a:t>organizations</a:t>
-            </a:r>
-            <a:r>
-              <a:rPr lang="it-IT" sz="2400" i="1" dirty="0"/>
-              <a:t>/</a:t>
-            </a:r>
-            <a:r>
-              <a:rPr lang="it-IT" sz="2400" b="1" i="1" dirty="0"/>
-              <a:t>{</a:t>
-            </a:r>
-            <a:r>
-              <a:rPr lang="it-IT" sz="2400" b="1" i="1" dirty="0" err="1"/>
-              <a:t>orgaizationId</a:t>
-            </a:r>
-            <a:r>
-              <a:rPr lang="it-IT" sz="2400" b="1" i="1" dirty="0"/>
-              <a:t>}</a:t>
-            </a:r>
-            <a:r>
-              <a:rPr lang="it-IT" sz="2400" i="1" dirty="0"/>
-              <a:t>/{</a:t>
-            </a:r>
-            <a:r>
-              <a:rPr lang="it-IT" sz="2400" i="1" dirty="0" err="1"/>
-              <a:t>endpointRisorsa</a:t>
-            </a:r>
-            <a:r>
-              <a:rPr lang="it-IT" sz="2400" i="1" dirty="0"/>
-              <a:t>}</a:t>
-            </a:r>
-          </a:p>
-          <a:p>
-            <a:endParaRPr lang="it-IT" sz="2400" dirty="0"/>
-          </a:p>
-        </p:txBody>
-      </p:sp>
-      <p:sp>
-        <p:nvSpPr>
-          <p:cNvPr id="9" name="CasellaDiTesto 8"/>
-          <p:cNvSpPr txBox="1"/>
-          <p:nvPr/>
-        </p:nvSpPr>
-        <p:spPr>
-          <a:xfrm>
-            <a:off x="6169829" y="3611241"/>
-            <a:ext cx="5678941" cy="646331"/>
-          </a:xfrm>
-          <a:prstGeom prst="rect">
-            <a:avLst/>
-          </a:prstGeom>
-          <a:noFill/>
-        </p:spPr>
-        <p:txBody>
-          <a:bodyPr wrap="square" rtlCol="0">
-            <a:spAutoFit/>
-          </a:bodyPr>
-          <a:lstStyle/>
-          <a:p>
-            <a:r>
-              <a:rPr lang="it-IT" sz="3600" dirty="0"/>
-              <a:t>Esempio richieste HTTP</a:t>
-            </a:r>
-          </a:p>
-        </p:txBody>
-      </p:sp>
-    </p:spTree>
-    <p:extLst>
-      <p:ext uri="{BB962C8B-B14F-4D97-AF65-F5344CB8AC3E}">
-        <p14:creationId xmlns:p14="http://schemas.microsoft.com/office/powerpoint/2010/main" val="3968237310"/>
-      </p:ext>
-    </p:extLst>
-  </p:cSld>
-  <p:clrMapOvr>
-    <a:masterClrMapping/>
-  </p:clrMapOvr>
-</p:sld>
-</file>
-
-<file path=ppt/slides/slide13.xml><?xml version="1.0" encoding="utf-8"?>
-<p:sld xmlns:a="http://schemas.openxmlformats.org/drawingml/2006/main" xmlns:r="http://schemas.openxmlformats.org/officeDocument/2006/relationships" xmlns:p="http://schemas.openxmlformats.org/presentationml/2006/main">
-  <p:cSld>
-    <p:bg>
-      <p:bgPr>
-        <a:blipFill dpi="0" rotWithShape="1">
-          <a:blip r:embed="rId2">
-            <a:lum/>
-          </a:blip>
-          <a:srcRect/>
-          <a:stretch>
-            <a:fillRect/>
-          </a:stretch>
-        </a:blipFill>
-        <a:effectLst/>
-      </p:bgPr>
-    </p:bg>
-    <p:spTree>
-      <p:nvGrpSpPr>
-        <p:cNvPr id="1" name=""/>
-        <p:cNvGrpSpPr/>
-        <p:nvPr/>
-      </p:nvGrpSpPr>
-      <p:grpSpPr>
-        <a:xfrm>
-          <a:off x="0" y="0"/>
-          <a:ext cx="0" cy="0"/>
-          <a:chOff x="0" y="0"/>
-          <a:chExt cx="0" cy="0"/>
-        </a:xfrm>
-      </p:grpSpPr>
-      <p:sp>
-        <p:nvSpPr>
-          <p:cNvPr id="2" name="Titolo 1"/>
-          <p:cNvSpPr>
-            <a:spLocks noGrp="1"/>
-          </p:cNvSpPr>
-          <p:nvPr>
-            <p:ph type="title"/>
-          </p:nvPr>
-        </p:nvSpPr>
-        <p:spPr>
-          <a:xfrm>
-            <a:off x="177019" y="111911"/>
-            <a:ext cx="10515600" cy="591474"/>
-          </a:xfrm>
-        </p:spPr>
-        <p:txBody>
-          <a:bodyPr>
-            <a:normAutofit fontScale="90000"/>
-          </a:bodyPr>
-          <a:lstStyle/>
-          <a:p>
-            <a:r>
-              <a:rPr lang="it-IT" dirty="0">
-                <a:solidFill>
-                  <a:schemeClr val="bg1"/>
-                </a:solidFill>
-              </a:rPr>
-              <a:t>Qualità e test</a:t>
-            </a:r>
-          </a:p>
-        </p:txBody>
-      </p:sp>
-      <p:pic>
-        <p:nvPicPr>
-          <p:cNvPr id="6" name="Segnaposto contenuto 5"/>
-          <p:cNvPicPr>
-            <a:picLocks noGrp="1" noChangeAspect="1"/>
-          </p:cNvPicPr>
-          <p:nvPr>
-            <p:ph idx="1"/>
-          </p:nvPr>
-        </p:nvPicPr>
-        <p:blipFill>
-          <a:blip r:embed="rId3">
-            <a:extLst>
-              <a:ext uri="{28A0092B-C50C-407E-A947-70E740481C1C}">
-                <a14:useLocalDpi xmlns:a14="http://schemas.microsoft.com/office/drawing/2010/main" val="0"/>
-              </a:ext>
-            </a:extLst>
-          </a:blip>
-          <a:stretch>
-            <a:fillRect/>
-          </a:stretch>
-        </p:blipFill>
-        <p:spPr>
-          <a:xfrm>
-            <a:off x="10583144" y="27504"/>
-            <a:ext cx="1511554" cy="675881"/>
-          </a:xfrm>
-        </p:spPr>
-      </p:pic>
-      <p:sp>
-        <p:nvSpPr>
-          <p:cNvPr id="7" name="CasellaDiTesto 6"/>
-          <p:cNvSpPr txBox="1"/>
-          <p:nvPr/>
-        </p:nvSpPr>
-        <p:spPr>
-          <a:xfrm>
-            <a:off x="11065565" y="6386732"/>
-            <a:ext cx="1029133" cy="369332"/>
-          </a:xfrm>
-          <a:prstGeom prst="rect">
-            <a:avLst/>
-          </a:prstGeom>
-          <a:noFill/>
-        </p:spPr>
-        <p:txBody>
-          <a:bodyPr wrap="square" rtlCol="0">
-            <a:spAutoFit/>
-          </a:bodyPr>
-          <a:lstStyle/>
-          <a:p>
-            <a:r>
-              <a:rPr lang="it-IT" dirty="0">
-                <a:solidFill>
-                  <a:schemeClr val="bg1"/>
-                </a:solidFill>
-              </a:rPr>
-              <a:t>12 di 13</a:t>
-            </a:r>
-          </a:p>
-        </p:txBody>
-      </p:sp>
-      <p:sp>
-        <p:nvSpPr>
-          <p:cNvPr id="3" name="CasellaDiTesto 2"/>
-          <p:cNvSpPr txBox="1"/>
-          <p:nvPr/>
-        </p:nvSpPr>
-        <p:spPr>
-          <a:xfrm>
-            <a:off x="177019" y="1033670"/>
-            <a:ext cx="11776442" cy="1323439"/>
-          </a:xfrm>
-          <a:prstGeom prst="rect">
-            <a:avLst/>
-          </a:prstGeom>
-          <a:noFill/>
-        </p:spPr>
-        <p:txBody>
-          <a:bodyPr wrap="square" rtlCol="0">
-            <a:spAutoFit/>
-          </a:bodyPr>
-          <a:lstStyle/>
-          <a:p>
-            <a:r>
-              <a:rPr lang="it-IT" sz="2400" dirty="0"/>
-              <a:t>Insieme delle caratteristiche di un'entità (prodotto, processo, servizio) che ne determinano la capacità di soddisfare esigenze espresse e implicite.</a:t>
-            </a:r>
-          </a:p>
-          <a:p>
-            <a:pPr algn="r"/>
-            <a:r>
-              <a:rPr lang="it-IT" sz="1400" i="1" dirty="0"/>
-              <a:t>(ISO 8402:1994, glossario dei termini, confluito in ISO 9000:2005)</a:t>
-            </a:r>
-          </a:p>
-          <a:p>
-            <a:endParaRPr lang="it-IT" dirty="0"/>
-          </a:p>
-        </p:txBody>
-      </p:sp>
-      <p:sp>
-        <p:nvSpPr>
-          <p:cNvPr id="5" name="CasellaDiTesto 4"/>
-          <p:cNvSpPr txBox="1"/>
-          <p:nvPr/>
-        </p:nvSpPr>
-        <p:spPr>
-          <a:xfrm>
-            <a:off x="4320209" y="2355331"/>
-            <a:ext cx="4174434" cy="646331"/>
-          </a:xfrm>
-          <a:prstGeom prst="rect">
-            <a:avLst/>
-          </a:prstGeom>
-          <a:noFill/>
-        </p:spPr>
-        <p:txBody>
-          <a:bodyPr wrap="square" rtlCol="0">
-            <a:spAutoFit/>
-          </a:bodyPr>
-          <a:lstStyle/>
-          <a:p>
-            <a:r>
-              <a:rPr lang="it-IT" sz="3600" dirty="0" err="1"/>
-              <a:t>Tests</a:t>
-            </a:r>
-            <a:r>
-              <a:rPr lang="it-IT" sz="3600" dirty="0"/>
-              <a:t> strutturali</a:t>
-            </a:r>
-          </a:p>
-        </p:txBody>
-      </p:sp>
-      <p:pic>
-        <p:nvPicPr>
-          <p:cNvPr id="8" name="Immagine 7"/>
-          <p:cNvPicPr>
-            <a:picLocks noChangeAspect="1"/>
-          </p:cNvPicPr>
-          <p:nvPr/>
-        </p:nvPicPr>
-        <p:blipFill>
-          <a:blip r:embed="rId4">
-            <a:extLst>
-              <a:ext uri="{28A0092B-C50C-407E-A947-70E740481C1C}">
-                <a14:useLocalDpi xmlns:a14="http://schemas.microsoft.com/office/drawing/2010/main" val="0"/>
-              </a:ext>
-            </a:extLst>
-          </a:blip>
-          <a:stretch>
-            <a:fillRect/>
-          </a:stretch>
-        </p:blipFill>
-        <p:spPr>
-          <a:xfrm>
-            <a:off x="2226665" y="3001662"/>
-            <a:ext cx="7438611" cy="3137277"/>
-          </a:xfrm>
-          <a:prstGeom prst="rect">
-            <a:avLst/>
-          </a:prstGeom>
-        </p:spPr>
-      </p:pic>
-    </p:spTree>
-    <p:extLst>
-      <p:ext uri="{BB962C8B-B14F-4D97-AF65-F5344CB8AC3E}">
-        <p14:creationId xmlns:p14="http://schemas.microsoft.com/office/powerpoint/2010/main" val="3414928305"/>
-      </p:ext>
-    </p:extLst>
-  </p:cSld>
-  <p:clrMapOvr>
-    <a:masterClrMapping/>
-  </p:clrMapOvr>
-</p:sld>
-</file>
-
-<file path=ppt/slides/slide14.xml><?xml version="1.0" encoding="utf-8"?>
-<p:sld xmlns:a="http://schemas.openxmlformats.org/drawingml/2006/main" xmlns:r="http://schemas.openxmlformats.org/officeDocument/2006/relationships" xmlns:p="http://schemas.openxmlformats.org/presentationml/2006/main">
-  <p:cSld>
-    <p:bg>
-      <p:bgPr>
-        <a:blipFill dpi="0" rotWithShape="1">
-          <a:blip r:embed="rId2">
-            <a:lum/>
-          </a:blip>
-          <a:srcRect/>
-          <a:stretch>
-            <a:fillRect/>
-          </a:stretch>
-        </a:blipFill>
-        <a:effectLst/>
-      </p:bgPr>
-    </p:bg>
-    <p:spTree>
-      <p:nvGrpSpPr>
-        <p:cNvPr id="1" name=""/>
-        <p:cNvGrpSpPr/>
-        <p:nvPr/>
-      </p:nvGrpSpPr>
-      <p:grpSpPr>
-        <a:xfrm>
-          <a:off x="0" y="0"/>
-          <a:ext cx="0" cy="0"/>
-          <a:chOff x="0" y="0"/>
-          <a:chExt cx="0" cy="0"/>
-        </a:xfrm>
-      </p:grpSpPr>
-      <p:sp>
-        <p:nvSpPr>
-          <p:cNvPr id="2" name="Titolo 1"/>
-          <p:cNvSpPr>
-            <a:spLocks noGrp="1"/>
-          </p:cNvSpPr>
-          <p:nvPr>
-            <p:ph type="title"/>
-          </p:nvPr>
-        </p:nvSpPr>
-        <p:spPr>
-          <a:xfrm>
-            <a:off x="177019" y="111911"/>
-            <a:ext cx="10515600" cy="591474"/>
-          </a:xfrm>
-        </p:spPr>
-        <p:txBody>
-          <a:bodyPr>
-            <a:normAutofit fontScale="90000"/>
-          </a:bodyPr>
-          <a:lstStyle/>
-          <a:p>
-            <a:r>
-              <a:rPr lang="it-IT" dirty="0">
-                <a:solidFill>
-                  <a:schemeClr val="bg1"/>
-                </a:solidFill>
-              </a:rPr>
-              <a:t>Conclusioni</a:t>
-            </a:r>
-          </a:p>
-        </p:txBody>
-      </p:sp>
-      <p:pic>
-        <p:nvPicPr>
-          <p:cNvPr id="6" name="Segnaposto contenuto 5"/>
-          <p:cNvPicPr>
-            <a:picLocks noGrp="1" noChangeAspect="1"/>
-          </p:cNvPicPr>
-          <p:nvPr>
-            <p:ph idx="1"/>
-          </p:nvPr>
-        </p:nvPicPr>
-        <p:blipFill>
-          <a:blip r:embed="rId3">
-            <a:extLst>
-              <a:ext uri="{28A0092B-C50C-407E-A947-70E740481C1C}">
-                <a14:useLocalDpi xmlns:a14="http://schemas.microsoft.com/office/drawing/2010/main" val="0"/>
-              </a:ext>
-            </a:extLst>
-          </a:blip>
-          <a:stretch>
-            <a:fillRect/>
-          </a:stretch>
-        </p:blipFill>
-        <p:spPr>
-          <a:xfrm>
-            <a:off x="10583144" y="27504"/>
-            <a:ext cx="1511554" cy="675881"/>
-          </a:xfrm>
-        </p:spPr>
-      </p:pic>
-      <p:sp>
-        <p:nvSpPr>
-          <p:cNvPr id="7" name="CasellaDiTesto 6"/>
-          <p:cNvSpPr txBox="1"/>
-          <p:nvPr/>
-        </p:nvSpPr>
-        <p:spPr>
-          <a:xfrm>
-            <a:off x="11092070" y="6386732"/>
-            <a:ext cx="1002628" cy="369332"/>
-          </a:xfrm>
-          <a:prstGeom prst="rect">
-            <a:avLst/>
-          </a:prstGeom>
-          <a:noFill/>
-        </p:spPr>
-        <p:txBody>
-          <a:bodyPr wrap="square" rtlCol="0">
-            <a:spAutoFit/>
-          </a:bodyPr>
-          <a:lstStyle/>
-          <a:p>
-            <a:r>
-              <a:rPr lang="it-IT" dirty="0">
-                <a:solidFill>
-                  <a:schemeClr val="bg1"/>
-                </a:solidFill>
-              </a:rPr>
-              <a:t>13 di 13</a:t>
+              <a:t>11 di 11</a:t>
             </a:r>
           </a:p>
         </p:txBody>
@@ -4472,7 +4050,6 @@
               <a:rPr lang="it-IT" sz="2400" dirty="0"/>
               <a:t>Integrare ulteriori tipologie di software CRM</a:t>
             </a:r>
-            <a:endParaRPr lang="it-IT" sz="2400" dirty="0"/>
           </a:p>
           <a:p>
             <a:pPr marL="285750" indent="-285750">
@@ -4627,7 +4204,7 @@
                   <a:schemeClr val="bg1"/>
                 </a:solidFill>
               </a:rPr>
-              <a:t>1 di 13</a:t>
+              <a:t>1 di 11</a:t>
             </a:r>
           </a:p>
         </p:txBody>
@@ -4908,7 +4485,7 @@
                   <a:schemeClr val="bg1"/>
                 </a:solidFill>
               </a:rPr>
-              <a:t>2 di 13</a:t>
+              <a:t>2 di 11</a:t>
             </a:r>
           </a:p>
         </p:txBody>
@@ -5193,7 +4770,7 @@
                   <a:schemeClr val="bg1"/>
                 </a:solidFill>
               </a:rPr>
-              <a:t>3 di 13</a:t>
+              <a:t>3 di 11</a:t>
             </a:r>
           </a:p>
         </p:txBody>
@@ -5512,7 +5089,7 @@
                   <a:schemeClr val="bg1"/>
                 </a:solidFill>
               </a:rPr>
-              <a:t>4 di 13</a:t>
+              <a:t>4 di 11</a:t>
             </a:r>
           </a:p>
         </p:txBody>
@@ -5682,21 +5259,26 @@
           <a:lstStyle/>
           <a:p>
             <a:r>
+              <a:rPr lang="it-IT" dirty="0">
+                <a:solidFill>
+                  <a:schemeClr val="bg1"/>
+                </a:solidFill>
+              </a:rPr>
+              <a:t>Architettura a </a:t>
+            </a:r>
+            <a:r>
               <a:rPr lang="it-IT" dirty="0" err="1">
                 <a:solidFill>
                   <a:schemeClr val="bg1"/>
                 </a:solidFill>
               </a:rPr>
-              <a:t>Microservizio</a:t>
-            </a:r>
-            <a:r>
-              <a:rPr lang="it-IT" dirty="0">
-                <a:solidFill>
-                  <a:schemeClr val="bg1"/>
-                </a:solidFill>
-              </a:rPr>
-              <a:t> vs Architettura Monolitica</a:t>
-            </a:r>
+              <a:t>Microservizi</a:t>
+            </a:r>
+            <a:endParaRPr lang="it-IT" dirty="0">
+              <a:solidFill>
+                <a:schemeClr val="bg1"/>
+              </a:solidFill>
+            </a:endParaRPr>
           </a:p>
         </p:txBody>
       </p:sp>
@@ -5757,14 +5339,14 @@
                   <a:schemeClr val="bg1"/>
                 </a:solidFill>
               </a:rPr>
-              <a:t>5 di 13</a:t>
+              <a:t>5 di 11</a:t>
             </a:r>
           </a:p>
         </p:txBody>
       </p:sp>
       <p:pic>
         <p:nvPicPr>
-          <p:cNvPr id="9" name="Immagine 8"/>
+          <p:cNvPr id="4" name="Immagine 3"/>
           <p:cNvPicPr>
             <a:picLocks noChangeAspect="1"/>
           </p:cNvPicPr>
@@ -5784,8 +5366,8 @@
         </p:blipFill>
         <p:spPr>
           <a:xfrm>
-            <a:off x="0" y="2389488"/>
-            <a:ext cx="11893725" cy="3206459"/>
+            <a:off x="1593968" y="1285461"/>
+            <a:ext cx="9269106" cy="2498881"/>
           </a:xfrm>
           <a:prstGeom prst="rect">
             <a:avLst/>
@@ -5794,22 +5376,22 @@
       </p:pic>
       <p:sp>
         <p:nvSpPr>
-          <p:cNvPr id="11" name="Rettangolo 10"/>
+          <p:cNvPr id="5" name="Rettangolo con angoli arrotondati 4"/>
           <p:cNvSpPr/>
           <p:nvPr/>
         </p:nvSpPr>
         <p:spPr>
           <a:xfrm>
-            <a:off x="4424036" y="2163636"/>
-            <a:ext cx="7469689" cy="3538330"/>
-          </a:xfrm>
-          <a:prstGeom prst="rect">
+            <a:off x="5062329" y="1087361"/>
+            <a:ext cx="2305879" cy="2895080"/>
+          </a:xfrm>
+          <a:prstGeom prst="roundRect">
             <a:avLst/>
           </a:prstGeom>
           <a:noFill/>
           <a:ln w="76200">
             <a:solidFill>
-              <a:srgbClr val="002060"/>
+              <a:srgbClr val="C00000"/>
             </a:solidFill>
           </a:ln>
         </p:spPr>
@@ -5840,60 +5422,14 @@
       </p:sp>
       <p:sp>
         <p:nvSpPr>
-          <p:cNvPr id="12" name="Rettangolo con angoli arrotondati 11"/>
-          <p:cNvSpPr/>
-          <p:nvPr/>
-        </p:nvSpPr>
-        <p:spPr>
-          <a:xfrm>
-            <a:off x="4257209" y="1872088"/>
-            <a:ext cx="3267835" cy="4121426"/>
-          </a:xfrm>
-          <a:prstGeom prst="roundRect">
-            <a:avLst/>
-          </a:prstGeom>
-          <a:noFill/>
-          <a:ln w="76200">
-            <a:solidFill>
-              <a:srgbClr val="C00000"/>
-            </a:solidFill>
-          </a:ln>
-        </p:spPr>
-        <p:style>
-          <a:lnRef idx="2">
-            <a:schemeClr val="accent1">
-              <a:shade val="50000"/>
-            </a:schemeClr>
-          </a:lnRef>
-          <a:fillRef idx="1">
-            <a:schemeClr val="accent1"/>
-          </a:fillRef>
-          <a:effectRef idx="0">
-            <a:schemeClr val="accent1"/>
-          </a:effectRef>
-          <a:fontRef idx="minor">
-            <a:schemeClr val="lt1"/>
-          </a:fontRef>
-        </p:style>
-        <p:txBody>
-          <a:bodyPr rtlCol="0" anchor="ctr"/>
-          <a:lstStyle/>
-          <a:p>
-            <a:pPr algn="ctr"/>
-            <a:endParaRPr lang="it-IT"/>
-          </a:p>
-        </p:txBody>
-      </p:sp>
-      <p:sp>
-        <p:nvSpPr>
-          <p:cNvPr id="13" name="CasellaDiTesto 12"/>
+          <p:cNvPr id="8" name="CasellaDiTesto 7"/>
           <p:cNvSpPr txBox="1"/>
           <p:nvPr/>
         </p:nvSpPr>
         <p:spPr>
           <a:xfrm>
-            <a:off x="4675828" y="1249236"/>
-            <a:ext cx="2319130" cy="523220"/>
+            <a:off x="7710910" y="2849218"/>
+            <a:ext cx="2809461" cy="584775"/>
           </a:xfrm>
           <a:prstGeom prst="rect">
             <a:avLst/>
@@ -5907,14 +5443,14 @@
           <a:lstStyle/>
           <a:p>
             <a:r>
-              <a:rPr lang="it-IT" sz="2800" b="1" dirty="0" err="1">
+              <a:rPr lang="it-IT" sz="3200" b="1" dirty="0" err="1">
                 <a:solidFill>
                   <a:srgbClr val="C00000"/>
                 </a:solidFill>
               </a:rPr>
               <a:t>Microservizio</a:t>
             </a:r>
-            <a:endParaRPr lang="it-IT" sz="2800" b="1" dirty="0">
+            <a:endParaRPr lang="it-IT" sz="3200" b="1" dirty="0">
               <a:solidFill>
                 <a:srgbClr val="C00000"/>
               </a:solidFill>
@@ -5924,14 +5460,14 @@
       </p:sp>
       <p:sp>
         <p:nvSpPr>
-          <p:cNvPr id="15" name="CasellaDiTesto 14"/>
+          <p:cNvPr id="14" name="CasellaDiTesto 13"/>
           <p:cNvSpPr txBox="1"/>
           <p:nvPr/>
         </p:nvSpPr>
         <p:spPr>
           <a:xfrm>
-            <a:off x="8818818" y="1096603"/>
-            <a:ext cx="2319130" cy="954107"/>
+            <a:off x="1050629" y="4366417"/>
+            <a:ext cx="8070574" cy="1384995"/>
           </a:xfrm>
           <a:prstGeom prst="rect">
             <a:avLst/>
@@ -5944,14 +5480,33 @@
           </a:bodyPr>
           <a:lstStyle/>
           <a:p>
-            <a:pPr algn="ctr"/>
-            <a:r>
-              <a:rPr lang="it-IT" sz="2800" b="1" dirty="0">
-                <a:solidFill>
-                  <a:srgbClr val="002060"/>
-                </a:solidFill>
-              </a:rPr>
-              <a:t>Architettura Monolitica</a:t>
+            <a:pPr marL="285750" indent="-285750">
+              <a:buFont typeface="Arial" panose="020B0604020202020204" pitchFamily="34" charset="0"/>
+              <a:buChar char="•"/>
+            </a:pPr>
+            <a:r>
+              <a:rPr lang="it-IT" sz="2800" dirty="0"/>
+              <a:t>Scalabilità del sistema</a:t>
+            </a:r>
+          </a:p>
+          <a:p>
+            <a:pPr marL="285750" indent="-285750">
+              <a:buFont typeface="Arial" panose="020B0604020202020204" pitchFamily="34" charset="0"/>
+              <a:buChar char="•"/>
+            </a:pPr>
+            <a:r>
+              <a:rPr lang="it-IT" sz="2800" dirty="0"/>
+              <a:t>Aumento Resilienza</a:t>
+            </a:r>
+          </a:p>
+          <a:p>
+            <a:pPr marL="285750" indent="-285750">
+              <a:buFont typeface="Arial" panose="020B0604020202020204" pitchFamily="34" charset="0"/>
+              <a:buChar char="•"/>
+            </a:pPr>
+            <a:r>
+              <a:rPr lang="it-IT" sz="2800" dirty="0"/>
+              <a:t>Separazione netta tra le componenti</a:t>
             </a:r>
           </a:p>
         </p:txBody>
@@ -6028,7 +5583,7 @@
                   <a:schemeClr val="bg1"/>
                 </a:solidFill>
               </a:rPr>
-              <a:t>Tecnologie e Linguaggi di sviluppo</a:t>
+              <a:t>Architettura Generale</a:t>
             </a:r>
           </a:p>
         </p:txBody>
@@ -6070,8 +5625,8 @@
         </p:nvSpPr>
         <p:spPr>
           <a:xfrm>
-            <a:off x="11251096" y="6386732"/>
-            <a:ext cx="843602" cy="369332"/>
+            <a:off x="11198087" y="6386732"/>
+            <a:ext cx="896612" cy="369332"/>
           </a:xfrm>
           <a:prstGeom prst="rect">
             <a:avLst/>
@@ -6090,14 +5645,14 @@
                   <a:schemeClr val="bg1"/>
                 </a:solidFill>
               </a:rPr>
-              <a:t>6 di 13</a:t>
+              <a:t>6 di 11</a:t>
             </a:r>
           </a:p>
         </p:txBody>
       </p:sp>
       <p:pic>
         <p:nvPicPr>
-          <p:cNvPr id="5" name="Immagine 4"/>
+          <p:cNvPr id="4" name="Immagine 3"/>
           <p:cNvPicPr>
             <a:picLocks noChangeAspect="1"/>
           </p:cNvPicPr>
@@ -6117,368 +5672,18 @@
         </p:blipFill>
         <p:spPr>
           <a:xfrm>
-            <a:off x="5285889" y="2929779"/>
-            <a:ext cx="2397214" cy="2397214"/>
+            <a:off x="177018" y="887895"/>
+            <a:ext cx="11917679" cy="5155089"/>
           </a:xfrm>
           <a:prstGeom prst="rect">
             <a:avLst/>
           </a:prstGeom>
         </p:spPr>
       </p:pic>
-      <p:pic>
-        <p:nvPicPr>
-          <p:cNvPr id="8" name="Immagine 7"/>
-          <p:cNvPicPr>
-            <a:picLocks noChangeAspect="1"/>
-          </p:cNvPicPr>
-          <p:nvPr/>
-        </p:nvPicPr>
-        <p:blipFill>
-          <a:blip r:embed="rId5">
-            <a:extLst>
-              <a:ext uri="{28A0092B-C50C-407E-A947-70E740481C1C}">
-                <a14:useLocalDpi xmlns:a14="http://schemas.microsoft.com/office/drawing/2010/main" val="0"/>
-              </a:ext>
-            </a:extLst>
-          </a:blip>
-          <a:stretch>
-            <a:fillRect/>
-          </a:stretch>
-        </p:blipFill>
-        <p:spPr>
-          <a:xfrm>
-            <a:off x="951461" y="2929779"/>
-            <a:ext cx="2772397" cy="2525962"/>
-          </a:xfrm>
-          <a:prstGeom prst="rect">
-            <a:avLst/>
-          </a:prstGeom>
-        </p:spPr>
-      </p:pic>
-      <p:sp>
-        <p:nvSpPr>
-          <p:cNvPr id="9" name="CasellaDiTesto 8"/>
-          <p:cNvSpPr txBox="1"/>
-          <p:nvPr/>
-        </p:nvSpPr>
-        <p:spPr>
-          <a:xfrm>
-            <a:off x="5327705" y="1181229"/>
-            <a:ext cx="2219025" cy="923330"/>
-          </a:xfrm>
-          <a:prstGeom prst="rect">
-            <a:avLst/>
-          </a:prstGeom>
-          <a:noFill/>
-        </p:spPr>
-        <p:txBody>
-          <a:bodyPr wrap="square" rtlCol="0">
-            <a:spAutoFit/>
-          </a:bodyPr>
-          <a:lstStyle/>
-          <a:p>
-            <a:r>
-              <a:rPr lang="it-IT" sz="5400" dirty="0"/>
-              <a:t>ADCrm</a:t>
-            </a:r>
-          </a:p>
-        </p:txBody>
-      </p:sp>
-      <p:sp>
-        <p:nvSpPr>
-          <p:cNvPr id="10" name="CasellaDiTesto 9"/>
-          <p:cNvSpPr txBox="1"/>
-          <p:nvPr/>
-        </p:nvSpPr>
-        <p:spPr>
-          <a:xfrm>
-            <a:off x="760650" y="1180853"/>
-            <a:ext cx="3154017" cy="923330"/>
-          </a:xfrm>
-          <a:prstGeom prst="rect">
-            <a:avLst/>
-          </a:prstGeom>
-          <a:noFill/>
-        </p:spPr>
-        <p:txBody>
-          <a:bodyPr wrap="square" rtlCol="0">
-            <a:spAutoFit/>
-          </a:bodyPr>
-          <a:lstStyle/>
-          <a:p>
-            <a:r>
-              <a:rPr lang="it-IT" sz="5400" dirty="0"/>
-              <a:t>ADProject</a:t>
-            </a:r>
-          </a:p>
-        </p:txBody>
-      </p:sp>
-      <p:sp>
-        <p:nvSpPr>
-          <p:cNvPr id="11" name="Rettangolo 10"/>
-          <p:cNvSpPr/>
-          <p:nvPr/>
-        </p:nvSpPr>
-        <p:spPr>
-          <a:xfrm>
-            <a:off x="9344173" y="1181229"/>
-            <a:ext cx="1348446" cy="923330"/>
-          </a:xfrm>
-          <a:prstGeom prst="rect">
-            <a:avLst/>
-          </a:prstGeom>
-        </p:spPr>
-        <p:txBody>
-          <a:bodyPr wrap="none">
-            <a:spAutoFit/>
-          </a:bodyPr>
-          <a:lstStyle/>
-          <a:p>
-            <a:pPr algn="ctr"/>
-            <a:r>
-              <a:rPr lang="it-IT" sz="5400" dirty="0" err="1"/>
-              <a:t>Crm</a:t>
-            </a:r>
-            <a:endParaRPr lang="it-IT" sz="5400" dirty="0"/>
-          </a:p>
-        </p:txBody>
-      </p:sp>
-      <p:pic>
-        <p:nvPicPr>
-          <p:cNvPr id="12" name="Immagine 11"/>
-          <p:cNvPicPr>
-            <a:picLocks noChangeAspect="1"/>
-          </p:cNvPicPr>
-          <p:nvPr/>
-        </p:nvPicPr>
-        <p:blipFill>
-          <a:blip r:embed="rId6">
-            <a:extLst>
-              <a:ext uri="{28A0092B-C50C-407E-A947-70E740481C1C}">
-                <a14:useLocalDpi xmlns:a14="http://schemas.microsoft.com/office/drawing/2010/main" val="0"/>
-              </a:ext>
-            </a:extLst>
-          </a:blip>
-          <a:stretch>
-            <a:fillRect/>
-          </a:stretch>
-        </p:blipFill>
-        <p:spPr>
-          <a:xfrm>
-            <a:off x="9385686" y="2878448"/>
-            <a:ext cx="1306933" cy="1301778"/>
-          </a:xfrm>
-          <a:prstGeom prst="rect">
-            <a:avLst/>
-          </a:prstGeom>
-        </p:spPr>
-      </p:pic>
-      <p:pic>
-        <p:nvPicPr>
-          <p:cNvPr id="13" name="Immagine 12"/>
-          <p:cNvPicPr>
-            <a:picLocks noChangeAspect="1"/>
-          </p:cNvPicPr>
-          <p:nvPr/>
-        </p:nvPicPr>
-        <p:blipFill>
-          <a:blip r:embed="rId7">
-            <a:extLst>
-              <a:ext uri="{28A0092B-C50C-407E-A947-70E740481C1C}">
-                <a14:useLocalDpi xmlns:a14="http://schemas.microsoft.com/office/drawing/2010/main" val="0"/>
-              </a:ext>
-            </a:extLst>
-          </a:blip>
-          <a:stretch>
-            <a:fillRect/>
-          </a:stretch>
-        </p:blipFill>
-        <p:spPr>
-          <a:xfrm>
-            <a:off x="8955381" y="4730287"/>
-            <a:ext cx="2227879" cy="1251275"/>
-          </a:xfrm>
-          <a:prstGeom prst="rect">
-            <a:avLst/>
-          </a:prstGeom>
-        </p:spPr>
-      </p:pic>
-      <p:sp>
-        <p:nvSpPr>
-          <p:cNvPr id="14" name="Segno di addizione 13"/>
-          <p:cNvSpPr/>
-          <p:nvPr/>
-        </p:nvSpPr>
-        <p:spPr>
-          <a:xfrm>
-            <a:off x="9778716" y="4213453"/>
-            <a:ext cx="581210" cy="516834"/>
-          </a:xfrm>
-          <a:prstGeom prst="mathPlus">
-            <a:avLst/>
-          </a:prstGeom>
-          <a:solidFill>
-            <a:srgbClr val="000000"/>
-          </a:solidFill>
-        </p:spPr>
-        <p:style>
-          <a:lnRef idx="2">
-            <a:schemeClr val="accent1">
-              <a:shade val="50000"/>
-            </a:schemeClr>
-          </a:lnRef>
-          <a:fillRef idx="1">
-            <a:schemeClr val="accent1"/>
-          </a:fillRef>
-          <a:effectRef idx="0">
-            <a:schemeClr val="accent1"/>
-          </a:effectRef>
-          <a:fontRef idx="minor">
-            <a:schemeClr val="lt1"/>
-          </a:fontRef>
-        </p:style>
-        <p:txBody>
-          <a:bodyPr rtlCol="0" anchor="ctr"/>
-          <a:lstStyle/>
-          <a:p>
-            <a:pPr algn="ctr"/>
-            <a:endParaRPr lang="it-IT"/>
-          </a:p>
-        </p:txBody>
-      </p:sp>
-      <p:sp>
-        <p:nvSpPr>
-          <p:cNvPr id="15" name="Freccia in giù 14"/>
-          <p:cNvSpPr/>
-          <p:nvPr/>
-        </p:nvSpPr>
-        <p:spPr>
-          <a:xfrm>
-            <a:off x="2138200" y="2104183"/>
-            <a:ext cx="398916" cy="703762"/>
-          </a:xfrm>
-          <a:prstGeom prst="downArrow">
-            <a:avLst/>
-          </a:prstGeom>
-          <a:solidFill>
-            <a:srgbClr val="000000"/>
-          </a:solidFill>
-        </p:spPr>
-        <p:style>
-          <a:lnRef idx="2">
-            <a:schemeClr val="accent1">
-              <a:shade val="50000"/>
-            </a:schemeClr>
-          </a:lnRef>
-          <a:fillRef idx="1">
-            <a:schemeClr val="accent1"/>
-          </a:fillRef>
-          <a:effectRef idx="0">
-            <a:schemeClr val="accent1"/>
-          </a:effectRef>
-          <a:fontRef idx="minor">
-            <a:schemeClr val="lt1"/>
-          </a:fontRef>
-        </p:style>
-        <p:txBody>
-          <a:bodyPr rtlCol="0" anchor="ctr"/>
-          <a:lstStyle/>
-          <a:p>
-            <a:pPr algn="ctr"/>
-            <a:endParaRPr lang="it-IT"/>
-          </a:p>
-        </p:txBody>
-      </p:sp>
-      <p:sp>
-        <p:nvSpPr>
-          <p:cNvPr id="17" name="Freccia in giù 16"/>
-          <p:cNvSpPr/>
-          <p:nvPr/>
-        </p:nvSpPr>
-        <p:spPr>
-          <a:xfrm>
-            <a:off x="6237759" y="2104183"/>
-            <a:ext cx="398916" cy="703762"/>
-          </a:xfrm>
-          <a:prstGeom prst="downArrow">
-            <a:avLst/>
-          </a:prstGeom>
-          <a:solidFill>
-            <a:srgbClr val="000000"/>
-          </a:solidFill>
-        </p:spPr>
-        <p:style>
-          <a:lnRef idx="2">
-            <a:schemeClr val="accent1">
-              <a:shade val="50000"/>
-            </a:schemeClr>
-          </a:lnRef>
-          <a:fillRef idx="1">
-            <a:schemeClr val="accent1"/>
-          </a:fillRef>
-          <a:effectRef idx="0">
-            <a:schemeClr val="accent1"/>
-          </a:effectRef>
-          <a:fontRef idx="minor">
-            <a:schemeClr val="lt1"/>
-          </a:fontRef>
-        </p:style>
-        <p:txBody>
-          <a:bodyPr rtlCol="0" anchor="ctr"/>
-          <a:lstStyle/>
-          <a:p>
-            <a:pPr algn="ctr"/>
-            <a:endParaRPr lang="it-IT"/>
-          </a:p>
-        </p:txBody>
-      </p:sp>
-      <p:sp>
-        <p:nvSpPr>
-          <p:cNvPr id="18" name="Freccia in giù 17"/>
-          <p:cNvSpPr/>
-          <p:nvPr/>
-        </p:nvSpPr>
-        <p:spPr>
-          <a:xfrm>
-            <a:off x="9818936" y="2103251"/>
-            <a:ext cx="398916" cy="703762"/>
-          </a:xfrm>
-          <a:prstGeom prst="downArrow">
-            <a:avLst/>
-          </a:prstGeom>
-          <a:solidFill>
-            <a:srgbClr val="000000"/>
-          </a:solidFill>
-        </p:spPr>
-        <p:style>
-          <a:lnRef idx="2">
-            <a:schemeClr val="accent1">
-              <a:shade val="50000"/>
-            </a:schemeClr>
-          </a:lnRef>
-          <a:fillRef idx="1">
-            <a:schemeClr val="accent1"/>
-          </a:fillRef>
-          <a:effectRef idx="0">
-            <a:schemeClr val="accent1"/>
-          </a:effectRef>
-          <a:fontRef idx="minor">
-            <a:schemeClr val="lt1"/>
-          </a:fontRef>
-        </p:style>
-        <p:txBody>
-          <a:bodyPr rtlCol="0" anchor="ctr"/>
-          <a:lstStyle/>
-          <a:p>
-            <a:pPr algn="ctr"/>
-            <a:endParaRPr lang="it-IT"/>
-          </a:p>
-        </p:txBody>
-      </p:sp>
     </p:spTree>
     <p:extLst>
       <p:ext uri="{BB962C8B-B14F-4D97-AF65-F5344CB8AC3E}">
-        <p14:creationId xmlns:p14="http://schemas.microsoft.com/office/powerpoint/2010/main" val="821987108"/>
+        <p14:creationId xmlns:p14="http://schemas.microsoft.com/office/powerpoint/2010/main" val="2088623736"/>
       </p:ext>
     </p:extLst>
   </p:cSld>
@@ -6547,7 +5752,7 @@
                   <a:schemeClr val="bg1"/>
                 </a:solidFill>
               </a:rPr>
-              <a:t>OAuth2.0</a:t>
+              <a:t>OAuth</a:t>
             </a:r>
           </a:p>
         </p:txBody>
@@ -6609,7 +5814,7 @@
                   <a:schemeClr val="bg1"/>
                 </a:solidFill>
               </a:rPr>
-              <a:t>7 di 13</a:t>
+              <a:t>7 di 11</a:t>
             </a:r>
           </a:p>
         </p:txBody>
@@ -6829,7 +6034,7 @@
                   <a:schemeClr val="bg1"/>
                 </a:solidFill>
               </a:rPr>
-              <a:t>8 di 13</a:t>
+              <a:t>8 di 11</a:t>
             </a:r>
           </a:p>
         </p:txBody>

</xml_diff>